<commit_message>
Updated all links to presntations
Some links were our of sync. Updated and created new zip
</commit_message>
<xml_diff>
--- a/2021-04-12to04-16 (A5) C53517 SoftMARS/11_11v01_MarsBaseAlpha_TechnologyTest.pptx
+++ b/2021-04-12to04-16 (A5) C53517 SoftMARS/11_11v01_MarsBaseAlpha_TechnologyTest.pptx
@@ -250,7 +250,7 @@
           <a:p>
             <a:fld id="{F319E496-E8FF-4856-B08F-DBE14D18B236}" type="datetimeFigureOut">
               <a:rPr lang="en-US" smtClean="0"/>
-              <a:t>1/5/2022</a:t>
+              <a:t>1/6/2022</a:t>
             </a:fld>
             <a:endParaRPr lang="en-US"/>
           </a:p>
@@ -427,7 +427,7 @@
           <a:p>
             <a:fld id="{4572F63B-EF0F-9942-98B2-F67CC88AF236}" type="datetimeFigureOut">
               <a:rPr lang="en-US" smtClean="0"/>
-              <a:t>1/5/2022</a:t>
+              <a:t>1/6/2022</a:t>
             </a:fld>
             <a:endParaRPr lang="en-US"/>
           </a:p>
@@ -1358,7 +1358,7 @@
               </a14:hiddenLine>
             </a:ext>
             <a:ext uri="{FAA26D3D-D897-4be2-8F04-BA451C77F1D7}">
-              <ma14:placeholderFlag xmlns:ma14="http://schemas.microsoft.com/office/mac/drawingml/2011/main" xmlns="" val="1"/>
+              <ma14:placeholderFlag xmlns="" xmlns:ma14="http://schemas.microsoft.com/office/mac/drawingml/2011/main" val="1"/>
             </a:ext>
           </a:extLst>
         </p:spPr>
@@ -1612,7 +1612,7 @@
               </a14:hiddenLine>
             </a:ext>
             <a:ext uri="{FAA26D3D-D897-4be2-8F04-BA451C77F1D7}">
-              <ma14:placeholderFlag xmlns:ma14="http://schemas.microsoft.com/office/mac/drawingml/2011/main" xmlns="" val="1"/>
+              <ma14:placeholderFlag xmlns="" xmlns:ma14="http://schemas.microsoft.com/office/mac/drawingml/2011/main" val="1"/>
             </a:ext>
           </a:extLst>
         </p:spPr>
@@ -2034,7 +2034,7 @@
               </a14:hiddenLine>
             </a:ext>
             <a:ext uri="{FAA26D3D-D897-4be2-8F04-BA451C77F1D7}">
-              <ma14:placeholderFlag xmlns:ma14="http://schemas.microsoft.com/office/mac/drawingml/2011/main" xmlns="" val="1"/>
+              <ma14:placeholderFlag xmlns="" xmlns:ma14="http://schemas.microsoft.com/office/mac/drawingml/2011/main" val="1"/>
             </a:ext>
           </a:extLst>
         </p:spPr>
@@ -2490,7 +2490,7 @@
               </a14:hiddenLine>
             </a:ext>
             <a:ext uri="{FAA26D3D-D897-4be2-8F04-BA451C77F1D7}">
-              <ma14:placeholderFlag xmlns:ma14="http://schemas.microsoft.com/office/mac/drawingml/2011/main" xmlns="" val="1"/>
+              <ma14:placeholderFlag xmlns="" xmlns:ma14="http://schemas.microsoft.com/office/mac/drawingml/2011/main" val="1"/>
             </a:ext>
           </a:extLst>
         </p:spPr>
@@ -5268,14 +5268,14 @@
           </a:ln>
           <a:extLst>
             <a:ext uri="{909E8E84-426E-40dd-AFC4-6F175D3DCCD1}">
-              <a14:hiddenFill xmlns="" xmlns:a14="http://schemas.microsoft.com/office/drawing/2010/main">
+              <a14:hiddenFill xmlns:a14="http://schemas.microsoft.com/office/drawing/2010/main" xmlns="">
                 <a:solidFill>
                   <a:schemeClr val="accent1"/>
                 </a:solidFill>
               </a14:hiddenFill>
             </a:ext>
             <a:ext uri="{91240B29-F687-4f45-9708-019B960494DF}">
-              <a14:hiddenLine xmlns="" xmlns:a14="http://schemas.microsoft.com/office/drawing/2010/main" w="9525">
+              <a14:hiddenLine xmlns:a14="http://schemas.microsoft.com/office/drawing/2010/main" xmlns="" w="9525">
                 <a:solidFill>
                   <a:schemeClr val="tx1"/>
                 </a:solidFill>
@@ -5759,7 +5759,7 @@
           <p:nvPr>
             <p:extLst>
               <p:ext uri="{D42A27DB-BD31-4B8C-83A1-F6EECF244321}">
-                <p14:modId xmlns:p14="http://schemas.microsoft.com/office/powerpoint/2010/main" val="570685027"/>
+                <p14:modId xmlns:p14="http://schemas.microsoft.com/office/powerpoint/2010/main" val="2980251774"/>
               </p:ext>
             </p:extLst>
           </p:nvPr>
@@ -5772,7 +5772,7 @@
           <a:graphicData uri="http://schemas.openxmlformats.org/presentationml/2006/ole">
             <mc:AlternateContent xmlns:mc="http://schemas.openxmlformats.org/markup-compatibility/2006">
               <mc:Choice xmlns:v="urn:schemas-microsoft-com:vml" Requires="v">
-                <p:oleObj spid="_x0000_s1029" name="Macro-Enabled Worksheet" r:id="rId3" imgW="5057763" imgH="2971715" progId="Excel.SheetMacroEnabled.12">
+                <p:oleObj spid="_x0000_s1032" name="Macro-Enabled Worksheet" r:id="rId3" imgW="5057763" imgH="2971715" progId="Excel.SheetMacroEnabled.12">
                   <p:link updateAutomatic="1"/>
                 </p:oleObj>
               </mc:Choice>
@@ -5822,7 +5822,7 @@
           <p:nvPr>
             <p:extLst>
               <p:ext uri="{D42A27DB-BD31-4B8C-83A1-F6EECF244321}">
-                <p14:modId xmlns:p14="http://schemas.microsoft.com/office/powerpoint/2010/main" val="4246510960"/>
+                <p14:modId xmlns:p14="http://schemas.microsoft.com/office/powerpoint/2010/main" val="1878663572"/>
               </p:ext>
             </p:extLst>
           </p:nvPr>
@@ -5835,7 +5835,7 @@
           <a:graphicData uri="http://schemas.openxmlformats.org/presentationml/2006/ole">
             <mc:AlternateContent xmlns:mc="http://schemas.openxmlformats.org/markup-compatibility/2006">
               <mc:Choice xmlns:v="urn:schemas-microsoft-com:vml" Requires="v">
-                <p:oleObj spid="_x0000_s1030" name="Macro-Enabled Worksheet" r:id="rId5" imgW="5057763" imgH="676332" progId="Excel.SheetMacroEnabled.12">
+                <p:oleObj spid="_x0000_s1033" name="Macro-Enabled Worksheet" r:id="rId5" imgW="5057763" imgH="676332" progId="Excel.SheetMacroEnabled.12">
                   <p:link updateAutomatic="1"/>
                 </p:oleObj>
               </mc:Choice>
@@ -5885,7 +5885,7 @@
           <p:nvPr>
             <p:extLst>
               <p:ext uri="{D42A27DB-BD31-4B8C-83A1-F6EECF244321}">
-                <p14:modId xmlns:p14="http://schemas.microsoft.com/office/powerpoint/2010/main" val="827651041"/>
+                <p14:modId xmlns:p14="http://schemas.microsoft.com/office/powerpoint/2010/main" val="656489120"/>
               </p:ext>
             </p:extLst>
           </p:nvPr>
@@ -5898,7 +5898,7 @@
           <a:graphicData uri="http://schemas.openxmlformats.org/presentationml/2006/ole">
             <mc:AlternateContent xmlns:mc="http://schemas.openxmlformats.org/markup-compatibility/2006">
               <mc:Choice xmlns:v="urn:schemas-microsoft-com:vml" Requires="v">
-                <p:oleObj spid="_x0000_s1031" name="Macro-Enabled Worksheet" r:id="rId7" imgW="5057763" imgH="304772" progId="Excel.SheetMacroEnabled.12">
+                <p:oleObj spid="_x0000_s1034" name="Macro-Enabled Worksheet" r:id="rId7" imgW="5057763" imgH="304772" progId="Excel.SheetMacroEnabled.12">
                   <p:link updateAutomatic="1"/>
                 </p:oleObj>
               </mc:Choice>
@@ -8984,69 +8984,6 @@
           <a:chExt cx="0" cy="0"/>
         </a:xfrm>
       </p:grpSpPr>
-      <p:graphicFrame>
-        <p:nvGraphicFramePr>
-          <p:cNvPr id="2" name="Object 1">
-            <a:extLst>
-              <a:ext uri="{FF2B5EF4-FFF2-40B4-BE49-F238E27FC236}">
-                <a16:creationId xmlns:a16="http://schemas.microsoft.com/office/drawing/2014/main" id="{0873E24D-5E7F-4294-B88E-4B0EB4F02513}"/>
-              </a:ext>
-            </a:extLst>
-          </p:cNvPr>
-          <p:cNvGraphicFramePr>
-            <a:graphicFrameLocks noChangeAspect="1"/>
-          </p:cNvGraphicFramePr>
-          <p:nvPr>
-            <p:extLst>
-              <p:ext uri="{D42A27DB-BD31-4B8C-83A1-F6EECF244321}">
-                <p14:modId xmlns:p14="http://schemas.microsoft.com/office/powerpoint/2010/main" val="2173692327"/>
-              </p:ext>
-            </p:extLst>
-          </p:nvPr>
-        </p:nvGraphicFramePr>
-        <p:xfrm>
-          <a:off x="1173163" y="1900238"/>
-          <a:ext cx="8809872" cy="1528762"/>
-        </p:xfrm>
-        <a:graphic>
-          <a:graphicData uri="http://schemas.openxmlformats.org/presentationml/2006/ole">
-            <mc:AlternateContent xmlns:mc="http://schemas.openxmlformats.org/markup-compatibility/2006">
-              <mc:Choice xmlns:v="urn:schemas-microsoft-com:vml" Requires="v">
-                <p:oleObj spid="_x0000_s2051" name="Macro-Enabled Worksheet" r:id="rId4" imgW="8252566" imgH="1432544" progId="Excel.SheetMacroEnabled.12">
-                  <p:link updateAutomatic="1"/>
-                </p:oleObj>
-              </mc:Choice>
-              <mc:Fallback>
-                <p:oleObj name="Macro-Enabled Worksheet" r:id="rId4" imgW="8252566" imgH="1432544" progId="Excel.SheetMacroEnabled.12">
-                  <p:link updateAutomatic="1"/>
-                  <p:pic>
-                    <p:nvPicPr>
-                      <p:cNvPr id="0" name=""/>
-                      <p:cNvPicPr/>
-                      <p:nvPr/>
-                    </p:nvPicPr>
-                    <p:blipFill>
-                      <a:blip r:embed="rId5"/>
-                      <a:stretch>
-                        <a:fillRect/>
-                      </a:stretch>
-                    </p:blipFill>
-                    <p:spPr>
-                      <a:xfrm>
-                        <a:off x="1173163" y="1900238"/>
-                        <a:ext cx="8809872" cy="1528762"/>
-                      </a:xfrm>
-                      <a:prstGeom prst="rect">
-                        <a:avLst/>
-                      </a:prstGeom>
-                    </p:spPr>
-                  </p:pic>
-                </p:oleObj>
-              </mc:Fallback>
-            </mc:AlternateContent>
-          </a:graphicData>
-        </a:graphic>
-      </p:graphicFrame>
       <p:sp>
         <p:nvSpPr>
           <p:cNvPr id="13313" name="Rectangle 3"/>
@@ -9077,6 +9014,69 @@
           </a:p>
         </p:txBody>
       </p:sp>
+      <p:graphicFrame>
+        <p:nvGraphicFramePr>
+          <p:cNvPr id="3" name="Object 2">
+            <a:extLst>
+              <a:ext uri="{FF2B5EF4-FFF2-40B4-BE49-F238E27FC236}">
+                <a16:creationId xmlns:a16="http://schemas.microsoft.com/office/drawing/2014/main" id="{5F159CF9-D190-4108-A66F-758467A67BA0}"/>
+              </a:ext>
+            </a:extLst>
+          </p:cNvPr>
+          <p:cNvGraphicFramePr>
+            <a:graphicFrameLocks noChangeAspect="1"/>
+          </p:cNvGraphicFramePr>
+          <p:nvPr>
+            <p:extLst>
+              <p:ext uri="{D42A27DB-BD31-4B8C-83A1-F6EECF244321}">
+                <p14:modId xmlns:p14="http://schemas.microsoft.com/office/powerpoint/2010/main" val="1682067287"/>
+              </p:ext>
+            </p:extLst>
+          </p:nvPr>
+        </p:nvGraphicFramePr>
+        <p:xfrm>
+          <a:off x="1173163" y="1900238"/>
+          <a:ext cx="8020050" cy="1352550"/>
+        </p:xfrm>
+        <a:graphic>
+          <a:graphicData uri="http://schemas.openxmlformats.org/presentationml/2006/ole">
+            <mc:AlternateContent xmlns:mc="http://schemas.openxmlformats.org/markup-compatibility/2006">
+              <mc:Choice xmlns:v="urn:schemas-microsoft-com:vml" Requires="v">
+                <p:oleObj spid="_x0000_s2052" name="Macro-Enabled Worksheet" r:id="rId4" imgW="8019882" imgH="1352664" progId="Excel.SheetMacroEnabled.12">
+                  <p:link updateAutomatic="1"/>
+                </p:oleObj>
+              </mc:Choice>
+              <mc:Fallback>
+                <p:oleObj name="Macro-Enabled Worksheet" r:id="rId4" imgW="8019882" imgH="1352664" progId="Excel.SheetMacroEnabled.12">
+                  <p:link updateAutomatic="1"/>
+                  <p:pic>
+                    <p:nvPicPr>
+                      <p:cNvPr id="0" name=""/>
+                      <p:cNvPicPr/>
+                      <p:nvPr/>
+                    </p:nvPicPr>
+                    <p:blipFill>
+                      <a:blip r:embed="rId5"/>
+                      <a:stretch>
+                        <a:fillRect/>
+                      </a:stretch>
+                    </p:blipFill>
+                    <p:spPr>
+                      <a:xfrm>
+                        <a:off x="1173163" y="1900238"/>
+                        <a:ext cx="8020050" cy="1352550"/>
+                      </a:xfrm>
+                      <a:prstGeom prst="rect">
+                        <a:avLst/>
+                      </a:prstGeom>
+                    </p:spPr>
+                  </p:pic>
+                </p:oleObj>
+              </mc:Fallback>
+            </mc:AlternateContent>
+          </a:graphicData>
+        </a:graphic>
+      </p:graphicFrame>
     </p:spTree>
     <p:extLst>
       <p:ext uri="{BB962C8B-B14F-4D97-AF65-F5344CB8AC3E}">
@@ -9122,7 +9122,7 @@
           <p:nvPr>
             <p:extLst>
               <p:ext uri="{D42A27DB-BD31-4B8C-83A1-F6EECF244321}">
-                <p14:modId xmlns:p14="http://schemas.microsoft.com/office/powerpoint/2010/main" val="1423067302"/>
+                <p14:modId xmlns:p14="http://schemas.microsoft.com/office/powerpoint/2010/main" val="3413483129"/>
               </p:ext>
             </p:extLst>
           </p:nvPr>
@@ -9135,12 +9135,12 @@
           <a:graphicData uri="http://schemas.openxmlformats.org/presentationml/2006/ole">
             <mc:AlternateContent xmlns:mc="http://schemas.openxmlformats.org/markup-compatibility/2006">
               <mc:Choice xmlns:v="urn:schemas-microsoft-com:vml" Requires="v">
-                <p:oleObj spid="_x0000_s3075" name="Macro-Enabled Worksheet" r:id="rId4" imgW="8252566" imgH="1584834" progId="Excel.SheetMacroEnabled.12">
+                <p:oleObj spid="_x0000_s3076" name="Macro-Enabled Worksheet" r:id="rId4" imgW="8019882" imgH="1466665" progId="Excel.SheetMacroEnabled.12">
                   <p:link updateAutomatic="1"/>
                 </p:oleObj>
               </mc:Choice>
               <mc:Fallback>
-                <p:oleObj name="Macro-Enabled Worksheet" r:id="rId4" imgW="8252566" imgH="1584834" progId="Excel.SheetMacroEnabled.12">
+                <p:oleObj name="Macro-Enabled Worksheet" r:id="rId4" imgW="8019882" imgH="1466665" progId="Excel.SheetMacroEnabled.12">
                   <p:link updateAutomatic="1"/>
                   <p:pic>
                     <p:nvPicPr>
@@ -9252,10 +9252,10 @@
       </p:sp>
       <p:graphicFrame>
         <p:nvGraphicFramePr>
-          <p:cNvPr id="3" name="Object 2">
+          <p:cNvPr id="2" name="Object 1">
             <a:extLst>
               <a:ext uri="{FF2B5EF4-FFF2-40B4-BE49-F238E27FC236}">
-                <a16:creationId xmlns:a16="http://schemas.microsoft.com/office/drawing/2014/main" id="{EA79724A-B99F-4803-8DB5-3CDE25C5723E}"/>
+                <a16:creationId xmlns:a16="http://schemas.microsoft.com/office/drawing/2014/main" id="{1B50E02C-C716-4CC3-8BC3-51D125EDBC61}"/>
               </a:ext>
             </a:extLst>
           </p:cNvPr>
@@ -9265,20 +9265,20 @@
           <p:nvPr>
             <p:extLst>
               <p:ext uri="{D42A27DB-BD31-4B8C-83A1-F6EECF244321}">
-                <p14:modId xmlns:p14="http://schemas.microsoft.com/office/powerpoint/2010/main" val="2079385137"/>
+                <p14:modId xmlns:p14="http://schemas.microsoft.com/office/powerpoint/2010/main" val="3219262905"/>
               </p:ext>
             </p:extLst>
           </p:nvPr>
         </p:nvGraphicFramePr>
         <p:xfrm>
           <a:off x="1244230" y="2167307"/>
-          <a:ext cx="8407400" cy="1987550"/>
+          <a:ext cx="8020050" cy="1952625"/>
         </p:xfrm>
         <a:graphic>
           <a:graphicData uri="http://schemas.openxmlformats.org/presentationml/2006/ole">
             <mc:AlternateContent xmlns:mc="http://schemas.openxmlformats.org/markup-compatibility/2006">
               <mc:Choice xmlns:v="urn:schemas-microsoft-com:vml" Requires="v">
-                <p:oleObj spid="_x0000_s4099" name="Macro-Enabled Worksheet" r:id="rId4" imgW="8019882" imgH="1952611" progId="Excel.SheetMacroEnabled.12">
+                <p:oleObj spid="_x0000_s4100" name="Macro-Enabled Worksheet" r:id="rId4" imgW="8019882" imgH="1952611" progId="Excel.SheetMacroEnabled.12">
                   <p:link updateAutomatic="1"/>
                 </p:oleObj>
               </mc:Choice>
@@ -9300,7 +9300,7 @@
                     <p:spPr>
                       <a:xfrm>
                         <a:off x="1244230" y="2167307"/>
-                        <a:ext cx="8407400" cy="1987550"/>
+                        <a:ext cx="8020050" cy="1952625"/>
                       </a:xfrm>
                       <a:prstGeom prst="rect">
                         <a:avLst/>
@@ -10477,12 +10477,9 @@
 </file>
 
 <file path=customXml/item1.xml><?xml version="1.0" encoding="utf-8"?>
-<?mso-contentType ?>
-<FormTemplates xmlns="http://schemas.microsoft.com/sharepoint/v3/contenttype/forms">
-  <Display>DocumentLibraryForm</Display>
-  <Edit>DocumentLibraryForm</Edit>
-  <New>DocumentLibraryForm</New>
-</FormTemplates>
+<p:properties xmlns:p="http://schemas.microsoft.com/office/2006/metadata/properties" xmlns:xsi="http://www.w3.org/2001/XMLSchema-instance" xmlns:pc="http://schemas.microsoft.com/office/infopath/2007/PartnerControls">
+  <documentManagement/>
+</p:properties>
 </file>
 
 <file path=customXml/item2.xml><?xml version="1.0" encoding="utf-8"?>
@@ -10697,15 +10694,27 @@
 </file>
 
 <file path=customXml/item3.xml><?xml version="1.0" encoding="utf-8"?>
-<p:properties xmlns:p="http://schemas.microsoft.com/office/2006/metadata/properties" xmlns:xsi="http://www.w3.org/2001/XMLSchema-instance" xmlns:pc="http://schemas.microsoft.com/office/infopath/2007/PartnerControls">
-  <documentManagement/>
-</p:properties>
+<?mso-contentType ?>
+<FormTemplates xmlns="http://schemas.microsoft.com/sharepoint/v3/contenttype/forms">
+  <Display>DocumentLibraryForm</Display>
+  <Edit>DocumentLibraryForm</Edit>
+  <New>DocumentLibraryForm</New>
+</FormTemplates>
 </file>
 
 <file path=customXml/itemProps1.xml><?xml version="1.0" encoding="utf-8"?>
-<ds:datastoreItem xmlns:ds="http://schemas.openxmlformats.org/officeDocument/2006/customXml" ds:itemID="{B8B49826-D5EE-4D24-B649-7C3A19B527D2}">
+<ds:datastoreItem xmlns:ds="http://schemas.openxmlformats.org/officeDocument/2006/customXml" ds:itemID="{5F07B0D7-F930-4230-933E-ABA84959494E}">
   <ds:schemaRefs>
-    <ds:schemaRef ds:uri="http://schemas.microsoft.com/sharepoint/v3/contenttype/forms"/>
+    <ds:schemaRef ds:uri="http://purl.org/dc/terms/"/>
+    <ds:schemaRef ds:uri="http://schemas.openxmlformats.org/package/2006/metadata/core-properties"/>
+    <ds:schemaRef ds:uri="72e3a154-4955-46c3-9573-e9dec3e1f195"/>
+    <ds:schemaRef ds:uri="http://purl.org/dc/dcmitype/"/>
+    <ds:schemaRef ds:uri="http://schemas.microsoft.com/office/infopath/2007/PartnerControls"/>
+    <ds:schemaRef ds:uri="http://schemas.microsoft.com/office/2006/documentManagement/types"/>
+    <ds:schemaRef ds:uri="http://purl.org/dc/elements/1.1/"/>
+    <ds:schemaRef ds:uri="ec500478-62e0-46fc-87f1-cfa988e486b4"/>
+    <ds:schemaRef ds:uri="http://schemas.microsoft.com/office/2006/metadata/properties"/>
+    <ds:schemaRef ds:uri="http://www.w3.org/XML/1998/namespace"/>
   </ds:schemaRefs>
 </ds:datastoreItem>
 </file>
@@ -10730,18 +10739,9 @@
 </file>
 
 <file path=customXml/itemProps3.xml><?xml version="1.0" encoding="utf-8"?>
-<ds:datastoreItem xmlns:ds="http://schemas.openxmlformats.org/officeDocument/2006/customXml" ds:itemID="{5F07B0D7-F930-4230-933E-ABA84959494E}">
+<ds:datastoreItem xmlns:ds="http://schemas.openxmlformats.org/officeDocument/2006/customXml" ds:itemID="{B8B49826-D5EE-4D24-B649-7C3A19B527D2}">
   <ds:schemaRefs>
-    <ds:schemaRef ds:uri="http://purl.org/dc/terms/"/>
-    <ds:schemaRef ds:uri="http://schemas.openxmlformats.org/package/2006/metadata/core-properties"/>
-    <ds:schemaRef ds:uri="72e3a154-4955-46c3-9573-e9dec3e1f195"/>
-    <ds:schemaRef ds:uri="http://purl.org/dc/dcmitype/"/>
-    <ds:schemaRef ds:uri="http://schemas.microsoft.com/office/infopath/2007/PartnerControls"/>
-    <ds:schemaRef ds:uri="http://schemas.microsoft.com/office/2006/documentManagement/types"/>
-    <ds:schemaRef ds:uri="http://purl.org/dc/elements/1.1/"/>
-    <ds:schemaRef ds:uri="ec500478-62e0-46fc-87f1-cfa988e486b4"/>
-    <ds:schemaRef ds:uri="http://schemas.microsoft.com/office/2006/metadata/properties"/>
-    <ds:schemaRef ds:uri="http://www.w3.org/XML/1998/namespace"/>
+    <ds:schemaRef ds:uri="http://schemas.microsoft.com/sharepoint/v3/contenttype/forms"/>
   </ds:schemaRefs>
 </ds:datastoreItem>
 </file>
</xml_diff>